<commit_message>
Update CS425 Game Engine Design Project.pptx
</commit_message>
<xml_diff>
--- a/CS425 Game Engine Design Project.pptx
+++ b/CS425 Game Engine Design Project.pptx
@@ -6289,7 +6289,7 @@
         </p:blipFill>
         <p:spPr>
           <a:xfrm>
-            <a:off x="-1" y="10"/>
+            <a:off x="0" y="7196"/>
             <a:ext cx="12192001" cy="6857990"/>
           </a:xfrm>
           <a:prstGeom prst="rect">
@@ -6297,241 +6297,6 @@
           </a:prstGeom>
         </p:spPr>
       </p:pic>
-      <p:sp useBgFill="1">
-        <p:nvSpPr>
-          <p:cNvPr id="103" name="Freeform 5">
-            <a:extLst>
-              <a:ext uri="{FF2B5EF4-FFF2-40B4-BE49-F238E27FC236}">
-                <a16:creationId xmlns:a16="http://schemas.microsoft.com/office/drawing/2014/main" id="{FE469E50-3893-4ED6-92BA-2985C32B0CA6}"/>
-              </a:ext>
-              <a:ext uri="{C183D7F6-B498-43B3-948B-1728B52AA6E4}">
-                <adec:decorative xmlns:adec="http://schemas.microsoft.com/office/drawing/2017/decorative" val="1"/>
-              </a:ext>
-            </a:extLst>
-          </p:cNvPr>
-          <p:cNvSpPr>
-            <a:spLocks noGrp="1" noRot="1" noChangeAspect="1" noMove="1" noResize="1" noEditPoints="1" noAdjustHandles="1" noChangeArrowheads="1" noChangeShapeType="1" noTextEdit="1"/>
-          </p:cNvSpPr>
-          <p:nvPr>
-            <p:extLst>
-              <p:ext uri="{386F3935-93C4-4BCD-93E2-E3B085C9AB24}">
-                <p16:designElem xmlns:p16="http://schemas.microsoft.com/office/powerpoint/2015/main" val="1"/>
-              </p:ext>
-            </p:extLst>
-          </p:nvPr>
-        </p:nvSpPr>
-        <p:spPr bwMode="auto">
-          <a:xfrm rot="5400000">
-            <a:off x="7131809" y="1385982"/>
-            <a:ext cx="4031414" cy="4100418"/>
-          </a:xfrm>
-          <a:custGeom>
-            <a:avLst/>
-            <a:gdLst>
-              <a:gd name="T0" fmla="*/ 1577 w 1601"/>
-              <a:gd name="T1" fmla="*/ 0 h 696"/>
-              <a:gd name="T2" fmla="*/ 833 w 1601"/>
-              <a:gd name="T3" fmla="*/ 0 h 696"/>
-              <a:gd name="T4" fmla="*/ 768 w 1601"/>
-              <a:gd name="T5" fmla="*/ 0 h 696"/>
-              <a:gd name="T6" fmla="*/ 24 w 1601"/>
-              <a:gd name="T7" fmla="*/ 0 h 696"/>
-              <a:gd name="T8" fmla="*/ 0 w 1601"/>
-              <a:gd name="T9" fmla="*/ 27 h 696"/>
-              <a:gd name="T10" fmla="*/ 0 w 1601"/>
-              <a:gd name="T11" fmla="*/ 669 h 696"/>
-              <a:gd name="T12" fmla="*/ 24 w 1601"/>
-              <a:gd name="T13" fmla="*/ 696 h 696"/>
-              <a:gd name="T14" fmla="*/ 768 w 1601"/>
-              <a:gd name="T15" fmla="*/ 696 h 696"/>
-              <a:gd name="T16" fmla="*/ 833 w 1601"/>
-              <a:gd name="T17" fmla="*/ 696 h 696"/>
-              <a:gd name="T18" fmla="*/ 1577 w 1601"/>
-              <a:gd name="T19" fmla="*/ 696 h 696"/>
-              <a:gd name="T20" fmla="*/ 1601 w 1601"/>
-              <a:gd name="T21" fmla="*/ 669 h 696"/>
-              <a:gd name="T22" fmla="*/ 1601 w 1601"/>
-              <a:gd name="T23" fmla="*/ 27 h 696"/>
-              <a:gd name="T24" fmla="*/ 1577 w 1601"/>
-              <a:gd name="T25" fmla="*/ 0 h 696"/>
-            </a:gdLst>
-            <a:ahLst/>
-            <a:cxnLst>
-              <a:cxn ang="0">
-                <a:pos x="T0" y="T1"/>
-              </a:cxn>
-              <a:cxn ang="0">
-                <a:pos x="T2" y="T3"/>
-              </a:cxn>
-              <a:cxn ang="0">
-                <a:pos x="T4" y="T5"/>
-              </a:cxn>
-              <a:cxn ang="0">
-                <a:pos x="T6" y="T7"/>
-              </a:cxn>
-              <a:cxn ang="0">
-                <a:pos x="T8" y="T9"/>
-              </a:cxn>
-              <a:cxn ang="0">
-                <a:pos x="T10" y="T11"/>
-              </a:cxn>
-              <a:cxn ang="0">
-                <a:pos x="T12" y="T13"/>
-              </a:cxn>
-              <a:cxn ang="0">
-                <a:pos x="T14" y="T15"/>
-              </a:cxn>
-              <a:cxn ang="0">
-                <a:pos x="T16" y="T17"/>
-              </a:cxn>
-              <a:cxn ang="0">
-                <a:pos x="T18" y="T19"/>
-              </a:cxn>
-              <a:cxn ang="0">
-                <a:pos x="T20" y="T21"/>
-              </a:cxn>
-              <a:cxn ang="0">
-                <a:pos x="T22" y="T23"/>
-              </a:cxn>
-              <a:cxn ang="0">
-                <a:pos x="T24" y="T25"/>
-              </a:cxn>
-            </a:cxnLst>
-            <a:rect l="0" t="0" r="r" b="b"/>
-            <a:pathLst>
-              <a:path w="1601" h="696">
-                <a:moveTo>
-                  <a:pt x="1577" y="0"/>
-                </a:moveTo>
-                <a:cubicBezTo>
-                  <a:pt x="833" y="0"/>
-                  <a:pt x="833" y="0"/>
-                  <a:pt x="833" y="0"/>
-                </a:cubicBezTo>
-                <a:cubicBezTo>
-                  <a:pt x="768" y="0"/>
-                  <a:pt x="768" y="0"/>
-                  <a:pt x="768" y="0"/>
-                </a:cubicBezTo>
-                <a:cubicBezTo>
-                  <a:pt x="24" y="0"/>
-                  <a:pt x="24" y="0"/>
-                  <a:pt x="24" y="0"/>
-                </a:cubicBezTo>
-                <a:cubicBezTo>
-                  <a:pt x="11" y="0"/>
-                  <a:pt x="0" y="12"/>
-                  <a:pt x="0" y="27"/>
-                </a:cubicBezTo>
-                <a:cubicBezTo>
-                  <a:pt x="0" y="669"/>
-                  <a:pt x="0" y="669"/>
-                  <a:pt x="0" y="669"/>
-                </a:cubicBezTo>
-                <a:cubicBezTo>
-                  <a:pt x="0" y="684"/>
-                  <a:pt x="11" y="696"/>
-                  <a:pt x="24" y="696"/>
-                </a:cubicBezTo>
-                <a:cubicBezTo>
-                  <a:pt x="768" y="696"/>
-                  <a:pt x="768" y="696"/>
-                  <a:pt x="768" y="696"/>
-                </a:cubicBezTo>
-                <a:cubicBezTo>
-                  <a:pt x="833" y="696"/>
-                  <a:pt x="833" y="696"/>
-                  <a:pt x="833" y="696"/>
-                </a:cubicBezTo>
-                <a:cubicBezTo>
-                  <a:pt x="1577" y="696"/>
-                  <a:pt x="1577" y="696"/>
-                  <a:pt x="1577" y="696"/>
-                </a:cubicBezTo>
-                <a:cubicBezTo>
-                  <a:pt x="1590" y="696"/>
-                  <a:pt x="1601" y="684"/>
-                  <a:pt x="1601" y="669"/>
-                </a:cubicBezTo>
-                <a:cubicBezTo>
-                  <a:pt x="1601" y="27"/>
-                  <a:pt x="1601" y="27"/>
-                  <a:pt x="1601" y="27"/>
-                </a:cubicBezTo>
-                <a:cubicBezTo>
-                  <a:pt x="1601" y="12"/>
-                  <a:pt x="1590" y="0"/>
-                  <a:pt x="1577" y="0"/>
-                </a:cubicBezTo>
-                <a:close/>
-              </a:path>
-            </a:pathLst>
-          </a:custGeom>
-          <a:ln>
-            <a:noFill/>
-          </a:ln>
-          <a:effectLst>
-            <a:outerShdw blurRad="50800" dist="38100" dir="5400000" algn="tl" rotWithShape="0">
-              <a:srgbClr val="000000">
-                <a:alpha val="43000"/>
-              </a:srgbClr>
-            </a:outerShdw>
-          </a:effectLst>
-          <a:extLst>
-            <a:ext uri="{91240B29-F687-4f45-9708-019B960494DF}">
-              <a14:hiddenLine xmlns:a16="http://schemas.microsoft.com/office/drawing/2014/main" xmlns:p14="http://schemas.microsoft.com/office/powerpoint/2010/main" xmlns:a14="http://schemas.microsoft.com/office/drawing/2010/main" xmlns="" w="9525">
-                <a:solidFill>
-                  <a:srgbClr val="000000"/>
-                </a:solidFill>
-                <a:round/>
-                <a:headEnd/>
-                <a:tailEnd/>
-              </a14:hiddenLine>
-            </a:ext>
-          </a:extLst>
-        </p:spPr>
-        <p:txBody>
-          <a:bodyPr vert="horz" wrap="square" lIns="91440" tIns="45720" rIns="91440" bIns="45720" numCol="1" anchor="t" anchorCtr="0" compatLnSpc="1">
-            <a:prstTxWarp prst="textNoShape">
-              <a:avLst/>
-            </a:prstTxWarp>
-          </a:bodyPr>
-          <a:lstStyle/>
-          <a:p>
-            <a:pPr marL="0" marR="0" lvl="0" indent="0" algn="l" defTabSz="914400" rtl="0" eaLnBrk="1" fontAlgn="auto" latinLnBrk="0" hangingPunct="1">
-              <a:lnSpc>
-                <a:spcPct val="100000"/>
-              </a:lnSpc>
-              <a:spcBef>
-                <a:spcPts val="0"/>
-              </a:spcBef>
-              <a:spcAft>
-                <a:spcPts val="0"/>
-              </a:spcAft>
-              <a:buClrTx/>
-              <a:buSzTx/>
-              <a:buFontTx/>
-              <a:buNone/>
-              <a:tabLst/>
-              <a:defRPr/>
-            </a:pPr>
-            <a:endParaRPr kumimoji="0" lang="en-US" sz="1800" b="0" i="0" u="none" strike="noStrike" kern="1200" cap="none" spc="0" normalizeH="0" baseline="0" noProof="0" dirty="0">
-              <a:ln>
-                <a:noFill/>
-              </a:ln>
-              <a:solidFill>
-                <a:prstClr val="white"/>
-              </a:solidFill>
-              <a:effectLst/>
-              <a:uLnTx/>
-              <a:uFillTx/>
-              <a:latin typeface="Goudy Old Style"/>
-              <a:ea typeface="+mn-ea"/>
-              <a:cs typeface="+mn-cs"/>
-            </a:endParaRPr>
-          </a:p>
-        </p:txBody>
-      </p:sp>
       <p:sp>
         <p:nvSpPr>
           <p:cNvPr id="2" name="Title 1">
@@ -6548,12 +6313,7 @@
             <p:ph type="ctrTitle"/>
           </p:nvPr>
         </p:nvSpPr>
-        <p:spPr>
-          <a:xfrm>
-            <a:off x="7389962" y="1673524"/>
-            <a:ext cx="3485073" cy="2420504"/>
-          </a:xfrm>
-        </p:spPr>
+        <p:spPr/>
         <p:txBody>
           <a:bodyPr>
             <a:normAutofit/>
@@ -6562,7 +6322,11 @@
           <a:p>
             <a:pPr algn="l"/>
             <a:r>
-              <a:rPr lang="en-US" sz="4000" dirty="0"/>
+              <a:rPr lang="en-US" sz="4000" dirty="0">
+                <a:solidFill>
+                  <a:schemeClr val="bg1"/>
+                </a:solidFill>
+              </a:rPr>
               <a:t>CS425 Game Engine Design Project</a:t>
             </a:r>
           </a:p>
@@ -6584,12 +6348,7 @@
             <p:ph type="subTitle" idx="1"/>
           </p:nvPr>
         </p:nvSpPr>
-        <p:spPr>
-          <a:xfrm>
-            <a:off x="7389965" y="4157933"/>
-            <a:ext cx="3485072" cy="1026544"/>
-          </a:xfrm>
-        </p:spPr>
+        <p:spPr/>
         <p:txBody>
           <a:bodyPr>
             <a:normAutofit/>
@@ -6598,17 +6357,29 @@
           <a:p>
             <a:pPr algn="l"/>
             <a:r>
-              <a:rPr lang="en-US" sz="2300" dirty="0"/>
+              <a:rPr lang="en-US" sz="2300" dirty="0">
+                <a:solidFill>
+                  <a:schemeClr val="bg1"/>
+                </a:solidFill>
+              </a:rPr>
               <a:t>Peter Shin</a:t>
             </a:r>
           </a:p>
           <a:p>
             <a:pPr algn="l"/>
             <a:r>
-              <a:rPr lang="en-US" dirty="0"/>
+              <a:rPr lang="en-US" dirty="0">
+                <a:solidFill>
+                  <a:schemeClr val="bg1"/>
+                </a:solidFill>
+              </a:rPr>
               <a:t>Renato Scudere.</a:t>
             </a:r>
-            <a:endParaRPr lang="en-US" sz="2300" dirty="0"/>
+            <a:endParaRPr lang="en-US" sz="2300" dirty="0">
+              <a:solidFill>
+                <a:schemeClr val="bg1"/>
+              </a:solidFill>
+            </a:endParaRPr>
           </a:p>
         </p:txBody>
       </p:sp>
@@ -6938,6 +6709,36 @@
           </a:p>
         </p:txBody>
       </p:sp>
+      <p:pic>
+        <p:nvPicPr>
+          <p:cNvPr id="5" name="Picture 4" descr="A picture containing shape&#10;&#10;Description automatically generated">
+            <a:extLst>
+              <a:ext uri="{FF2B5EF4-FFF2-40B4-BE49-F238E27FC236}">
+                <a16:creationId xmlns:a16="http://schemas.microsoft.com/office/drawing/2014/main" id="{FDEF0187-CB4A-5C35-C9DF-9025CB597E5D}"/>
+              </a:ext>
+            </a:extLst>
+          </p:cNvPr>
+          <p:cNvPicPr>
+            <a:picLocks noChangeAspect="1"/>
+          </p:cNvPicPr>
+          <p:nvPr/>
+        </p:nvPicPr>
+        <p:blipFill>
+          <a:blip r:embed="rId7"/>
+          <a:stretch>
+            <a:fillRect/>
+          </a:stretch>
+        </p:blipFill>
+        <p:spPr>
+          <a:xfrm>
+            <a:off x="110902" y="1784365"/>
+            <a:ext cx="5856952" cy="3289270"/>
+          </a:xfrm>
+          <a:prstGeom prst="rect">
+            <a:avLst/>
+          </a:prstGeom>
+        </p:spPr>
+      </p:pic>
     </p:spTree>
     <p:extLst>
       <p:ext uri="{BB962C8B-B14F-4D97-AF65-F5344CB8AC3E}">
@@ -7632,15 +7433,6 @@
 </file>
 
 <file path=customXml/item1.xml><?xml version="1.0" encoding="utf-8"?>
-<p:properties xmlns:p="http://schemas.microsoft.com/office/2006/metadata/properties" xmlns:xsi="http://www.w3.org/2001/XMLSchema-instance" xmlns:pc="http://schemas.microsoft.com/office/infopath/2007/PartnerControls">
-  <documentManagement>
-    <Status xmlns="71af3243-3dd4-4a8d-8c0d-dd76da1f02a5">Not started</Status>
-    <MediaServiceKeyPoints xmlns="71af3243-3dd4-4a8d-8c0d-dd76da1f02a5" xsi:nil="true"/>
-  </documentManagement>
-</p:properties>
-</file>
-
-<file path=customXml/item2.xml><?xml version="1.0" encoding="utf-8"?>
 <ct:contentTypeSchema xmlns:ct="http://schemas.microsoft.com/office/2006/metadata/contentType" xmlns:ma="http://schemas.microsoft.com/office/2006/metadata/properties/metaAttributes" ct:_="" ma:_="" ma:contentTypeName="Document" ma:contentTypeID="0x01010079F111ED35F8CC479449609E8A0923A6" ma:contentTypeVersion="12" ma:contentTypeDescription="Create a new document." ma:contentTypeScope="" ma:versionID="a410dd7f93c95333ffa1b60ed6adedd1">
   <xsd:schema xmlns:xsd="http://www.w3.org/2001/XMLSchema" xmlns:xs="http://www.w3.org/2001/XMLSchema" xmlns:p="http://schemas.microsoft.com/office/2006/metadata/properties" xmlns:ns2="71af3243-3dd4-4a8d-8c0d-dd76da1f02a5" xmlns:ns3="16c05727-aa75-4e4a-9b5f-8a80a1165891" targetNamespace="http://schemas.microsoft.com/office/2006/metadata/properties" ma:root="true" ma:fieldsID="a936d9baba76aa3866493feff160faab" ns2:_="" ns3:_="">
     <xsd:import namespace="71af3243-3dd4-4a8d-8c0d-dd76da1f02a5"/>
@@ -7861,6 +7653,15 @@
 </ct:contentTypeSchema>
 </file>
 
+<file path=customXml/item2.xml><?xml version="1.0" encoding="utf-8"?>
+<p:properties xmlns:p="http://schemas.microsoft.com/office/2006/metadata/properties" xmlns:xsi="http://www.w3.org/2001/XMLSchema-instance" xmlns:pc="http://schemas.microsoft.com/office/infopath/2007/PartnerControls">
+  <documentManagement>
+    <Status xmlns="71af3243-3dd4-4a8d-8c0d-dd76da1f02a5">Not started</Status>
+    <MediaServiceKeyPoints xmlns="71af3243-3dd4-4a8d-8c0d-dd76da1f02a5" xsi:nil="true"/>
+  </documentManagement>
+</p:properties>
+</file>
+
 <file path=customXml/item3.xml><?xml version="1.0" encoding="utf-8"?>
 <?mso-contentType ?>
 <FormTemplates xmlns="http://schemas.microsoft.com/sharepoint/v3/contenttype/forms">
@@ -7871,16 +7672,6 @@
 </file>
 
 <file path=customXml/itemProps1.xml><?xml version="1.0" encoding="utf-8"?>
-<ds:datastoreItem xmlns:ds="http://schemas.openxmlformats.org/officeDocument/2006/customXml" ds:itemID="{2C4C00F4-06E9-43E3-AD97-88A857CEFA82}">
-  <ds:schemaRefs>
-    <ds:schemaRef ds:uri="http://schemas.microsoft.com/office/2006/metadata/properties"/>
-    <ds:schemaRef ds:uri="http://schemas.microsoft.com/office/infopath/2007/PartnerControls"/>
-    <ds:schemaRef ds:uri="71af3243-3dd4-4a8d-8c0d-dd76da1f02a5"/>
-  </ds:schemaRefs>
-</ds:datastoreItem>
-</file>
-
-<file path=customXml/itemProps2.xml><?xml version="1.0" encoding="utf-8"?>
 <ds:datastoreItem xmlns:ds="http://schemas.openxmlformats.org/officeDocument/2006/customXml" ds:itemID="{0585E981-8C91-4205-A0C3-C991F42B4C9E}">
   <ds:schemaRefs>
     <ds:schemaRef ds:uri="http://schemas.microsoft.com/office/2006/metadata/contentType"/>
@@ -7899,6 +7690,16 @@
 </ds:datastoreItem>
 </file>
 
+<file path=customXml/itemProps2.xml><?xml version="1.0" encoding="utf-8"?>
+<ds:datastoreItem xmlns:ds="http://schemas.openxmlformats.org/officeDocument/2006/customXml" ds:itemID="{2C4C00F4-06E9-43E3-AD97-88A857CEFA82}">
+  <ds:schemaRefs>
+    <ds:schemaRef ds:uri="http://schemas.microsoft.com/office/2006/metadata/properties"/>
+    <ds:schemaRef ds:uri="http://schemas.microsoft.com/office/infopath/2007/PartnerControls"/>
+    <ds:schemaRef ds:uri="71af3243-3dd4-4a8d-8c0d-dd76da1f02a5"/>
+  </ds:schemaRefs>
+</ds:datastoreItem>
+</file>
+
 <file path=customXml/itemProps3.xml><?xml version="1.0" encoding="utf-8"?>
 <ds:datastoreItem xmlns:ds="http://schemas.openxmlformats.org/officeDocument/2006/customXml" ds:itemID="{64B270AB-C138-415C-897E-3C24487DECF1}">
   <ds:schemaRefs>

</xml_diff>